<commit_message>
final app version + final documentation version
</commit_message>
<xml_diff>
--- a/Prezentare licenta.pptx
+++ b/Prezentare licenta.pptx
@@ -5,7 +5,7 @@
     <p:sldMasterId id="2147483711" r:id="rId1"/>
   </p:sldMasterIdLst>
   <p:notesMasterIdLst>
-    <p:notesMasterId r:id="rId24"/>
+    <p:notesMasterId r:id="rId25"/>
   </p:notesMasterIdLst>
   <p:sldIdLst>
     <p:sldId id="256" r:id="rId2"/>
@@ -29,7 +29,8 @@
     <p:sldId id="278" r:id="rId20"/>
     <p:sldId id="271" r:id="rId21"/>
     <p:sldId id="263" r:id="rId22"/>
-    <p:sldId id="264" r:id="rId23"/>
+    <p:sldId id="279" r:id="rId23"/>
+    <p:sldId id="264" r:id="rId24"/>
   </p:sldIdLst>
   <p:sldSz cx="12192000" cy="6858000"/>
   <p:notesSz cx="6858000" cy="9144000"/>
@@ -530,6 +531,46 @@
           <a:bodyPr/>
           <a:lstStyle/>
           <a:p>
+            <a:r>
+              <a:rPr lang="en-US" dirty="0" err="1"/>
+              <a:t>Va</a:t>
+            </a:r>
+            <a:r>
+              <a:rPr lang="en-US" dirty="0"/>
+              <a:t> </a:t>
+            </a:r>
+            <a:r>
+              <a:rPr lang="en-US" dirty="0" err="1"/>
+              <a:t>voi</a:t>
+            </a:r>
+            <a:r>
+              <a:rPr lang="en-US" dirty="0"/>
+              <a:t> </a:t>
+            </a:r>
+            <a:r>
+              <a:rPr lang="en-US" dirty="0" err="1"/>
+              <a:t>prezenta</a:t>
+            </a:r>
+            <a:r>
+              <a:rPr lang="en-US" dirty="0"/>
+              <a:t> </a:t>
+            </a:r>
+            <a:r>
+              <a:rPr lang="en-US" dirty="0" err="1"/>
+              <a:t>proiectul</a:t>
+            </a:r>
+            <a:r>
+              <a:rPr lang="en-US" dirty="0"/>
+              <a:t> meu de </a:t>
+            </a:r>
+            <a:r>
+              <a:rPr lang="en-US" dirty="0" err="1"/>
+              <a:t>licenta</a:t>
+            </a:r>
+            <a:r>
+              <a:rPr lang="en-US" dirty="0"/>
+              <a:t>…</a:t>
+            </a:r>
             <a:endParaRPr lang="ro-RO" dirty="0"/>
           </a:p>
         </p:txBody>
@@ -561,6 +602,463 @@
     <p:extLst>
       <p:ext uri="{BB962C8B-B14F-4D97-AF65-F5344CB8AC3E}">
         <p14:creationId xmlns:p14="http://schemas.microsoft.com/office/powerpoint/2010/main" val="4096935329"/>
+      </p:ext>
+    </p:extLst>
+  </p:cSld>
+  <p:clrMapOvr>
+    <a:masterClrMapping/>
+  </p:clrMapOvr>
+</p:notes>
+</file>
+
+<file path=ppt/notesSlides/notesSlide10.xml><?xml version="1.0" encoding="utf-8"?>
+<p:notes xmlns:a="http://schemas.openxmlformats.org/drawingml/2006/main" xmlns:r="http://schemas.openxmlformats.org/officeDocument/2006/relationships" xmlns:p="http://schemas.openxmlformats.org/presentationml/2006/main">
+  <p:cSld>
+    <p:spTree>
+      <p:nvGrpSpPr>
+        <p:cNvPr id="1" name=""/>
+        <p:cNvGrpSpPr/>
+        <p:nvPr/>
+      </p:nvGrpSpPr>
+      <p:grpSpPr>
+        <a:xfrm>
+          <a:off x="0" y="0"/>
+          <a:ext cx="0" cy="0"/>
+          <a:chOff x="0" y="0"/>
+          <a:chExt cx="0" cy="0"/>
+        </a:xfrm>
+      </p:grpSpPr>
+      <p:sp>
+        <p:nvSpPr>
+          <p:cNvPr id="2" name="Slide Image Placeholder 1"/>
+          <p:cNvSpPr>
+            <a:spLocks noGrp="1" noRot="1" noChangeAspect="1"/>
+          </p:cNvSpPr>
+          <p:nvPr>
+            <p:ph type="sldImg"/>
+          </p:nvPr>
+        </p:nvSpPr>
+        <p:spPr/>
+      </p:sp>
+      <p:sp>
+        <p:nvSpPr>
+          <p:cNvPr id="3" name="Notes Placeholder 2"/>
+          <p:cNvSpPr>
+            <a:spLocks noGrp="1"/>
+          </p:cNvSpPr>
+          <p:nvPr>
+            <p:ph type="body" idx="1"/>
+          </p:nvPr>
+        </p:nvSpPr>
+        <p:spPr/>
+        <p:txBody>
+          <a:bodyPr/>
+          <a:lstStyle/>
+          <a:p>
+            <a:r>
+              <a:rPr lang="en-US" dirty="0" err="1"/>
+              <a:t>Diagrrama</a:t>
+            </a:r>
+            <a:r>
+              <a:rPr lang="en-US" dirty="0"/>
+              <a:t> </a:t>
+            </a:r>
+            <a:r>
+              <a:rPr lang="en-US" dirty="0" err="1"/>
+              <a:t>fara</a:t>
+            </a:r>
+            <a:r>
+              <a:rPr lang="en-US" dirty="0"/>
+              <a:t> text, </a:t>
+            </a:r>
+            <a:r>
+              <a:rPr lang="en-US" dirty="0" err="1"/>
+              <a:t>textul</a:t>
+            </a:r>
+            <a:r>
+              <a:rPr lang="en-US" dirty="0"/>
+              <a:t> </a:t>
+            </a:r>
+            <a:r>
+              <a:rPr lang="en-US" dirty="0" err="1"/>
+              <a:t>il</a:t>
+            </a:r>
+            <a:r>
+              <a:rPr lang="en-US" dirty="0"/>
+              <a:t> spun </a:t>
+            </a:r>
+            <a:r>
+              <a:rPr lang="en-US" dirty="0" err="1"/>
+              <a:t>eu</a:t>
+            </a:r>
+            <a:r>
+              <a:rPr lang="en-US" dirty="0"/>
+              <a:t>.</a:t>
+            </a:r>
+            <a:endParaRPr lang="ro-RO" dirty="0"/>
+          </a:p>
+        </p:txBody>
+      </p:sp>
+      <p:sp>
+        <p:nvSpPr>
+          <p:cNvPr id="4" name="Slide Number Placeholder 3"/>
+          <p:cNvSpPr>
+            <a:spLocks noGrp="1"/>
+          </p:cNvSpPr>
+          <p:nvPr>
+            <p:ph type="sldNum" sz="quarter" idx="5"/>
+          </p:nvPr>
+        </p:nvSpPr>
+        <p:spPr/>
+        <p:txBody>
+          <a:bodyPr/>
+          <a:lstStyle/>
+          <a:p>
+            <a:fld id="{2D8B77B1-706E-6944-BD13-9A49B05C937A}" type="slidenum">
+              <a:rPr lang="ro-RO" smtClean="0"/>
+              <a:t>20</a:t>
+            </a:fld>
+            <a:endParaRPr lang="ro-RO"/>
+          </a:p>
+        </p:txBody>
+      </p:sp>
+    </p:spTree>
+    <p:extLst>
+      <p:ext uri="{BB962C8B-B14F-4D97-AF65-F5344CB8AC3E}">
+        <p14:creationId xmlns:p14="http://schemas.microsoft.com/office/powerpoint/2010/main" val="246412828"/>
+      </p:ext>
+    </p:extLst>
+  </p:cSld>
+  <p:clrMapOvr>
+    <a:masterClrMapping/>
+  </p:clrMapOvr>
+</p:notes>
+</file>
+
+<file path=ppt/notesSlides/notesSlide11.xml><?xml version="1.0" encoding="utf-8"?>
+<p:notes xmlns:a="http://schemas.openxmlformats.org/drawingml/2006/main" xmlns:r="http://schemas.openxmlformats.org/officeDocument/2006/relationships" xmlns:p="http://schemas.openxmlformats.org/presentationml/2006/main">
+  <p:cSld>
+    <p:spTree>
+      <p:nvGrpSpPr>
+        <p:cNvPr id="1" name=""/>
+        <p:cNvGrpSpPr/>
+        <p:nvPr/>
+      </p:nvGrpSpPr>
+      <p:grpSpPr>
+        <a:xfrm>
+          <a:off x="0" y="0"/>
+          <a:ext cx="0" cy="0"/>
+          <a:chOff x="0" y="0"/>
+          <a:chExt cx="0" cy="0"/>
+        </a:xfrm>
+      </p:grpSpPr>
+      <p:sp>
+        <p:nvSpPr>
+          <p:cNvPr id="2" name="Slide Image Placeholder 1"/>
+          <p:cNvSpPr>
+            <a:spLocks noGrp="1" noRot="1" noChangeAspect="1"/>
+          </p:cNvSpPr>
+          <p:nvPr>
+            <p:ph type="sldImg"/>
+          </p:nvPr>
+        </p:nvSpPr>
+        <p:spPr/>
+      </p:sp>
+      <p:sp>
+        <p:nvSpPr>
+          <p:cNvPr id="3" name="Notes Placeholder 2"/>
+          <p:cNvSpPr>
+            <a:spLocks noGrp="1"/>
+          </p:cNvSpPr>
+          <p:nvPr>
+            <p:ph type="body" idx="1"/>
+          </p:nvPr>
+        </p:nvSpPr>
+        <p:spPr/>
+        <p:txBody>
+          <a:bodyPr/>
+          <a:lstStyle/>
+          <a:p>
+            <a:r>
+              <a:rPr lang="en-US" dirty="0"/>
+              <a:t>Am </a:t>
+            </a:r>
+            <a:r>
+              <a:rPr lang="en-US" dirty="0" err="1"/>
+              <a:t>testat</a:t>
+            </a:r>
+            <a:r>
+              <a:rPr lang="en-US" dirty="0"/>
+              <a:t> </a:t>
+            </a:r>
+            <a:r>
+              <a:rPr lang="en-US" dirty="0" err="1"/>
+              <a:t>aplicatia</a:t>
+            </a:r>
+            <a:r>
+              <a:rPr lang="en-US" dirty="0"/>
+              <a:t> cu </a:t>
+            </a:r>
+            <a:r>
+              <a:rPr lang="en-US" dirty="0" err="1"/>
+              <a:t>colegii</a:t>
+            </a:r>
+            <a:r>
+              <a:rPr lang="en-US" dirty="0"/>
+              <a:t> </a:t>
+            </a:r>
+            <a:r>
+              <a:rPr lang="en-US" dirty="0" err="1"/>
+              <a:t>mei</a:t>
+            </a:r>
+            <a:r>
+              <a:rPr lang="en-US" dirty="0"/>
+              <a:t> </a:t>
+            </a:r>
+            <a:r>
+              <a:rPr lang="en-US" dirty="0" err="1"/>
+              <a:t>pentru</a:t>
+            </a:r>
+            <a:r>
+              <a:rPr lang="en-US" dirty="0"/>
+              <a:t> </a:t>
+            </a:r>
+            <a:r>
+              <a:rPr lang="en-US" dirty="0" err="1"/>
+              <a:t>impartirea</a:t>
+            </a:r>
+            <a:r>
+              <a:rPr lang="en-US" dirty="0"/>
+              <a:t> </a:t>
+            </a:r>
+            <a:r>
+              <a:rPr lang="en-US" dirty="0" err="1"/>
+              <a:t>mai</a:t>
+            </a:r>
+            <a:r>
+              <a:rPr lang="en-US" dirty="0"/>
+              <a:t> </a:t>
+            </a:r>
+            <a:r>
+              <a:rPr lang="en-US" dirty="0" err="1"/>
+              <a:t>usoara</a:t>
+            </a:r>
+            <a:r>
+              <a:rPr lang="en-US" dirty="0"/>
+              <a:t> a </a:t>
+            </a:r>
+            <a:r>
+              <a:rPr lang="en-US" dirty="0" err="1"/>
+              <a:t>platii</a:t>
+            </a:r>
+            <a:r>
+              <a:rPr lang="en-US" dirty="0"/>
+              <a:t>.</a:t>
+            </a:r>
+          </a:p>
+          <a:p>
+            <a:endParaRPr lang="en-US" dirty="0"/>
+          </a:p>
+          <a:p>
+            <a:endParaRPr lang="ro-RO" dirty="0"/>
+          </a:p>
+        </p:txBody>
+      </p:sp>
+      <p:sp>
+        <p:nvSpPr>
+          <p:cNvPr id="4" name="Slide Number Placeholder 3"/>
+          <p:cNvSpPr>
+            <a:spLocks noGrp="1"/>
+          </p:cNvSpPr>
+          <p:nvPr>
+            <p:ph type="sldNum" sz="quarter" idx="5"/>
+          </p:nvPr>
+        </p:nvSpPr>
+        <p:spPr/>
+        <p:txBody>
+          <a:bodyPr/>
+          <a:lstStyle/>
+          <a:p>
+            <a:fld id="{2D8B77B1-706E-6944-BD13-9A49B05C937A}" type="slidenum">
+              <a:rPr lang="ro-RO" smtClean="0"/>
+              <a:t>21</a:t>
+            </a:fld>
+            <a:endParaRPr lang="ro-RO"/>
+          </a:p>
+        </p:txBody>
+      </p:sp>
+    </p:spTree>
+    <p:extLst>
+      <p:ext uri="{BB962C8B-B14F-4D97-AF65-F5344CB8AC3E}">
+        <p14:creationId xmlns:p14="http://schemas.microsoft.com/office/powerpoint/2010/main" val="63349653"/>
+      </p:ext>
+    </p:extLst>
+  </p:cSld>
+  <p:clrMapOvr>
+    <a:masterClrMapping/>
+  </p:clrMapOvr>
+</p:notes>
+</file>
+
+<file path=ppt/notesSlides/notesSlide12.xml><?xml version="1.0" encoding="utf-8"?>
+<p:notes xmlns:a="http://schemas.openxmlformats.org/drawingml/2006/main" xmlns:r="http://schemas.openxmlformats.org/officeDocument/2006/relationships" xmlns:p="http://schemas.openxmlformats.org/presentationml/2006/main">
+  <p:cSld>
+    <p:spTree>
+      <p:nvGrpSpPr>
+        <p:cNvPr id="1" name=""/>
+        <p:cNvGrpSpPr/>
+        <p:nvPr/>
+      </p:nvGrpSpPr>
+      <p:grpSpPr>
+        <a:xfrm>
+          <a:off x="0" y="0"/>
+          <a:ext cx="0" cy="0"/>
+          <a:chOff x="0" y="0"/>
+          <a:chExt cx="0" cy="0"/>
+        </a:xfrm>
+      </p:grpSpPr>
+      <p:sp>
+        <p:nvSpPr>
+          <p:cNvPr id="2" name="Slide Image Placeholder 1"/>
+          <p:cNvSpPr>
+            <a:spLocks noGrp="1" noRot="1" noChangeAspect="1"/>
+          </p:cNvSpPr>
+          <p:nvPr>
+            <p:ph type="sldImg"/>
+          </p:nvPr>
+        </p:nvSpPr>
+        <p:spPr/>
+      </p:sp>
+      <p:sp>
+        <p:nvSpPr>
+          <p:cNvPr id="3" name="Notes Placeholder 2"/>
+          <p:cNvSpPr>
+            <a:spLocks noGrp="1"/>
+          </p:cNvSpPr>
+          <p:nvPr>
+            <p:ph type="body" idx="1"/>
+          </p:nvPr>
+        </p:nvSpPr>
+        <p:spPr/>
+        <p:txBody>
+          <a:bodyPr/>
+          <a:lstStyle/>
+          <a:p>
+            <a:endParaRPr lang="ro-RO" dirty="0"/>
+          </a:p>
+        </p:txBody>
+      </p:sp>
+      <p:sp>
+        <p:nvSpPr>
+          <p:cNvPr id="4" name="Slide Number Placeholder 3"/>
+          <p:cNvSpPr>
+            <a:spLocks noGrp="1"/>
+          </p:cNvSpPr>
+          <p:nvPr>
+            <p:ph type="sldNum" sz="quarter" idx="5"/>
+          </p:nvPr>
+        </p:nvSpPr>
+        <p:spPr/>
+        <p:txBody>
+          <a:bodyPr/>
+          <a:lstStyle/>
+          <a:p>
+            <a:fld id="{2D8B77B1-706E-6944-BD13-9A49B05C937A}" type="slidenum">
+              <a:rPr lang="ro-RO" smtClean="0"/>
+              <a:t>22</a:t>
+            </a:fld>
+            <a:endParaRPr lang="ro-RO"/>
+          </a:p>
+        </p:txBody>
+      </p:sp>
+    </p:spTree>
+    <p:extLst>
+      <p:ext uri="{BB962C8B-B14F-4D97-AF65-F5344CB8AC3E}">
+        <p14:creationId xmlns:p14="http://schemas.microsoft.com/office/powerpoint/2010/main" val="3994275064"/>
+      </p:ext>
+    </p:extLst>
+  </p:cSld>
+  <p:clrMapOvr>
+    <a:masterClrMapping/>
+  </p:clrMapOvr>
+</p:notes>
+</file>
+
+<file path=ppt/notesSlides/notesSlide13.xml><?xml version="1.0" encoding="utf-8"?>
+<p:notes xmlns:a="http://schemas.openxmlformats.org/drawingml/2006/main" xmlns:r="http://schemas.openxmlformats.org/officeDocument/2006/relationships" xmlns:p="http://schemas.openxmlformats.org/presentationml/2006/main">
+  <p:cSld>
+    <p:spTree>
+      <p:nvGrpSpPr>
+        <p:cNvPr id="1" name=""/>
+        <p:cNvGrpSpPr/>
+        <p:nvPr/>
+      </p:nvGrpSpPr>
+      <p:grpSpPr>
+        <a:xfrm>
+          <a:off x="0" y="0"/>
+          <a:ext cx="0" cy="0"/>
+          <a:chOff x="0" y="0"/>
+          <a:chExt cx="0" cy="0"/>
+        </a:xfrm>
+      </p:grpSpPr>
+      <p:sp>
+        <p:nvSpPr>
+          <p:cNvPr id="2" name="Slide Image Placeholder 1"/>
+          <p:cNvSpPr>
+            <a:spLocks noGrp="1" noRot="1" noChangeAspect="1"/>
+          </p:cNvSpPr>
+          <p:nvPr>
+            <p:ph type="sldImg"/>
+          </p:nvPr>
+        </p:nvSpPr>
+        <p:spPr/>
+      </p:sp>
+      <p:sp>
+        <p:nvSpPr>
+          <p:cNvPr id="3" name="Notes Placeholder 2"/>
+          <p:cNvSpPr>
+            <a:spLocks noGrp="1"/>
+          </p:cNvSpPr>
+          <p:nvPr>
+            <p:ph type="body" idx="1"/>
+          </p:nvPr>
+        </p:nvSpPr>
+        <p:spPr/>
+        <p:txBody>
+          <a:bodyPr/>
+          <a:lstStyle/>
+          <a:p>
+            <a:endParaRPr lang="ro-RO" dirty="0"/>
+          </a:p>
+        </p:txBody>
+      </p:sp>
+      <p:sp>
+        <p:nvSpPr>
+          <p:cNvPr id="4" name="Slide Number Placeholder 3"/>
+          <p:cNvSpPr>
+            <a:spLocks noGrp="1"/>
+          </p:cNvSpPr>
+          <p:nvPr>
+            <p:ph type="sldNum" sz="quarter" idx="5"/>
+          </p:nvPr>
+        </p:nvSpPr>
+        <p:spPr/>
+        <p:txBody>
+          <a:bodyPr/>
+          <a:lstStyle/>
+          <a:p>
+            <a:fld id="{2D8B77B1-706E-6944-BD13-9A49B05C937A}" type="slidenum">
+              <a:rPr lang="ro-RO" smtClean="0"/>
+              <a:t>23</a:t>
+            </a:fld>
+            <a:endParaRPr lang="ro-RO"/>
+          </a:p>
+        </p:txBody>
+      </p:sp>
+    </p:spTree>
+    <p:extLst>
+      <p:ext uri="{BB962C8B-B14F-4D97-AF65-F5344CB8AC3E}">
+        <p14:creationId xmlns:p14="http://schemas.microsoft.com/office/powerpoint/2010/main" val="651721477"/>
       </p:ext>
     </p:extLst>
   </p:cSld>
@@ -635,7 +1133,7 @@
           <a:p>
             <a:fld id="{2D8B77B1-706E-6944-BD13-9A49B05C937A}" type="slidenum">
               <a:rPr lang="ro-RO" smtClean="0"/>
-              <a:t>4</a:t>
+              <a:t>2</a:t>
             </a:fld>
             <a:endParaRPr lang="ro-RO"/>
           </a:p>
@@ -644,7 +1142,7 @@
     </p:spTree>
     <p:extLst>
       <p:ext uri="{BB962C8B-B14F-4D97-AF65-F5344CB8AC3E}">
-        <p14:creationId xmlns:p14="http://schemas.microsoft.com/office/powerpoint/2010/main" val="1787302424"/>
+        <p14:creationId xmlns:p14="http://schemas.microsoft.com/office/powerpoint/2010/main" val="206922452"/>
       </p:ext>
     </p:extLst>
   </p:cSld>
@@ -698,6 +1196,50 @@
           <a:bodyPr/>
           <a:lstStyle/>
           <a:p>
+            <a:r>
+              <a:rPr lang="en-US" dirty="0" err="1"/>
+              <a:t>Liniutii</a:t>
+            </a:r>
+            <a:r>
+              <a:rPr lang="en-US" dirty="0"/>
+              <a:t> pe slide, </a:t>
+            </a:r>
+            <a:r>
+              <a:rPr lang="en-US" dirty="0" err="1"/>
+              <a:t>si</a:t>
+            </a:r>
+            <a:r>
+              <a:rPr lang="en-US" dirty="0"/>
+              <a:t> </a:t>
+            </a:r>
+            <a:r>
+              <a:rPr lang="en-US" dirty="0" err="1"/>
+              <a:t>eu</a:t>
+            </a:r>
+            <a:r>
+              <a:rPr lang="en-US" dirty="0"/>
+              <a:t> </a:t>
+            </a:r>
+            <a:r>
+              <a:rPr lang="en-US" dirty="0" err="1"/>
+              <a:t>imi</a:t>
+            </a:r>
+            <a:r>
+              <a:rPr lang="en-US" dirty="0"/>
+              <a:t> pun </a:t>
+            </a:r>
+            <a:r>
+              <a:rPr lang="en-US" dirty="0" err="1"/>
+              <a:t>textul</a:t>
+            </a:r>
+            <a:r>
+              <a:rPr lang="en-US" dirty="0"/>
+              <a:t> pe </a:t>
+            </a:r>
+            <a:r>
+              <a:rPr lang="en-US" dirty="0" err="1"/>
+              <a:t>notite</a:t>
+            </a:r>
             <a:endParaRPr lang="ro-RO" dirty="0"/>
           </a:p>
         </p:txBody>
@@ -719,7 +1261,7 @@
           <a:p>
             <a:fld id="{2D8B77B1-706E-6944-BD13-9A49B05C937A}" type="slidenum">
               <a:rPr lang="ro-RO" smtClean="0"/>
-              <a:t>9</a:t>
+              <a:t>4</a:t>
             </a:fld>
             <a:endParaRPr lang="ro-RO"/>
           </a:p>
@@ -728,7 +1270,7 @@
     </p:spTree>
     <p:extLst>
       <p:ext uri="{BB962C8B-B14F-4D97-AF65-F5344CB8AC3E}">
-        <p14:creationId xmlns:p14="http://schemas.microsoft.com/office/powerpoint/2010/main" val="2249226919"/>
+        <p14:creationId xmlns:p14="http://schemas.microsoft.com/office/powerpoint/2010/main" val="1787302424"/>
       </p:ext>
     </p:extLst>
   </p:cSld>
@@ -803,7 +1345,7 @@
           <a:p>
             <a:fld id="{2D8B77B1-706E-6944-BD13-9A49B05C937A}" type="slidenum">
               <a:rPr lang="ro-RO" smtClean="0"/>
-              <a:t>11</a:t>
+              <a:t>9</a:t>
             </a:fld>
             <a:endParaRPr lang="ro-RO"/>
           </a:p>
@@ -812,7 +1354,7 @@
     </p:spTree>
     <p:extLst>
       <p:ext uri="{BB962C8B-B14F-4D97-AF65-F5344CB8AC3E}">
-        <p14:creationId xmlns:p14="http://schemas.microsoft.com/office/powerpoint/2010/main" val="4054283190"/>
+        <p14:creationId xmlns:p14="http://schemas.microsoft.com/office/powerpoint/2010/main" val="2249226919"/>
       </p:ext>
     </p:extLst>
   </p:cSld>
@@ -866,6 +1408,350 @@
           <a:bodyPr/>
           <a:lstStyle/>
           <a:p>
+            <a:r>
+              <a:rPr lang="en-US" dirty="0"/>
+              <a:t>Ca am </a:t>
+            </a:r>
+            <a:r>
+              <a:rPr lang="en-US" dirty="0" err="1"/>
+              <a:t>cautat</a:t>
+            </a:r>
+            <a:r>
+              <a:rPr lang="en-US" dirty="0"/>
+              <a:t> pe net am </a:t>
+            </a:r>
+            <a:r>
+              <a:rPr lang="en-US" dirty="0" err="1"/>
+              <a:t>antrenat</a:t>
+            </a:r>
+            <a:r>
+              <a:rPr lang="en-US" dirty="0"/>
+              <a:t> </a:t>
+            </a:r>
+            <a:r>
+              <a:rPr lang="en-US" dirty="0" err="1"/>
+              <a:t>reteaua</a:t>
+            </a:r>
+            <a:r>
+              <a:rPr lang="en-US" dirty="0"/>
+              <a:t> </a:t>
+            </a:r>
+            <a:r>
+              <a:rPr lang="en-US" dirty="0" err="1"/>
+              <a:t>si</a:t>
+            </a:r>
+            <a:r>
+              <a:rPr lang="en-US" dirty="0"/>
+              <a:t> am </a:t>
+            </a:r>
+            <a:r>
+              <a:rPr lang="en-US" dirty="0" err="1"/>
+              <a:t>facut</a:t>
+            </a:r>
+            <a:r>
+              <a:rPr lang="en-US" dirty="0"/>
+              <a:t> teste comparative </a:t>
+            </a:r>
+            <a:r>
+              <a:rPr lang="en-US" dirty="0" err="1"/>
+              <a:t>si</a:t>
+            </a:r>
+            <a:r>
+              <a:rPr lang="en-US" dirty="0"/>
+              <a:t> am </a:t>
+            </a:r>
+            <a:r>
+              <a:rPr lang="en-US" dirty="0" err="1"/>
+              <a:t>vazut</a:t>
+            </a:r>
+            <a:r>
+              <a:rPr lang="en-US" dirty="0"/>
+              <a:t> ca google </a:t>
+            </a:r>
+            <a:r>
+              <a:rPr lang="en-US" dirty="0" err="1"/>
+              <a:t>api</a:t>
+            </a:r>
+            <a:r>
+              <a:rPr lang="en-US" dirty="0"/>
+              <a:t> da </a:t>
+            </a:r>
+            <a:r>
+              <a:rPr lang="en-US" dirty="0" err="1"/>
+              <a:t>mai</a:t>
+            </a:r>
+            <a:r>
+              <a:rPr lang="en-US" dirty="0"/>
+              <a:t> bine.</a:t>
+            </a:r>
+            <a:endParaRPr lang="ro-RO" dirty="0"/>
+          </a:p>
+        </p:txBody>
+      </p:sp>
+      <p:sp>
+        <p:nvSpPr>
+          <p:cNvPr id="4" name="Slide Number Placeholder 3"/>
+          <p:cNvSpPr>
+            <a:spLocks noGrp="1"/>
+          </p:cNvSpPr>
+          <p:nvPr>
+            <p:ph type="sldNum" sz="quarter" idx="5"/>
+          </p:nvPr>
+        </p:nvSpPr>
+        <p:spPr/>
+        <p:txBody>
+          <a:bodyPr/>
+          <a:lstStyle/>
+          <a:p>
+            <a:fld id="{2D8B77B1-706E-6944-BD13-9A49B05C937A}" type="slidenum">
+              <a:rPr lang="ro-RO" smtClean="0"/>
+              <a:t>10</a:t>
+            </a:fld>
+            <a:endParaRPr lang="ro-RO"/>
+          </a:p>
+        </p:txBody>
+      </p:sp>
+    </p:spTree>
+    <p:extLst>
+      <p:ext uri="{BB962C8B-B14F-4D97-AF65-F5344CB8AC3E}">
+        <p14:creationId xmlns:p14="http://schemas.microsoft.com/office/powerpoint/2010/main" val="1601561190"/>
+      </p:ext>
+    </p:extLst>
+  </p:cSld>
+  <p:clrMapOvr>
+    <a:masterClrMapping/>
+  </p:clrMapOvr>
+</p:notes>
+</file>
+
+<file path=ppt/notesSlides/notesSlide6.xml><?xml version="1.0" encoding="utf-8"?>
+<p:notes xmlns:a="http://schemas.openxmlformats.org/drawingml/2006/main" xmlns:r="http://schemas.openxmlformats.org/officeDocument/2006/relationships" xmlns:p="http://schemas.openxmlformats.org/presentationml/2006/main">
+  <p:cSld>
+    <p:spTree>
+      <p:nvGrpSpPr>
+        <p:cNvPr id="1" name=""/>
+        <p:cNvGrpSpPr/>
+        <p:nvPr/>
+      </p:nvGrpSpPr>
+      <p:grpSpPr>
+        <a:xfrm>
+          <a:off x="0" y="0"/>
+          <a:ext cx="0" cy="0"/>
+          <a:chOff x="0" y="0"/>
+          <a:chExt cx="0" cy="0"/>
+        </a:xfrm>
+      </p:grpSpPr>
+      <p:sp>
+        <p:nvSpPr>
+          <p:cNvPr id="2" name="Slide Image Placeholder 1"/>
+          <p:cNvSpPr>
+            <a:spLocks noGrp="1" noRot="1" noChangeAspect="1"/>
+          </p:cNvSpPr>
+          <p:nvPr>
+            <p:ph type="sldImg"/>
+          </p:nvPr>
+        </p:nvSpPr>
+        <p:spPr/>
+      </p:sp>
+      <p:sp>
+        <p:nvSpPr>
+          <p:cNvPr id="3" name="Notes Placeholder 2"/>
+          <p:cNvSpPr>
+            <a:spLocks noGrp="1"/>
+          </p:cNvSpPr>
+          <p:nvPr>
+            <p:ph type="body" idx="1"/>
+          </p:nvPr>
+        </p:nvSpPr>
+        <p:spPr/>
+        <p:txBody>
+          <a:bodyPr/>
+          <a:lstStyle/>
+          <a:p>
+            <a:endParaRPr lang="ro-RO" dirty="0"/>
+          </a:p>
+        </p:txBody>
+      </p:sp>
+      <p:sp>
+        <p:nvSpPr>
+          <p:cNvPr id="4" name="Slide Number Placeholder 3"/>
+          <p:cNvSpPr>
+            <a:spLocks noGrp="1"/>
+          </p:cNvSpPr>
+          <p:nvPr>
+            <p:ph type="sldNum" sz="quarter" idx="5"/>
+          </p:nvPr>
+        </p:nvSpPr>
+        <p:spPr/>
+        <p:txBody>
+          <a:bodyPr/>
+          <a:lstStyle/>
+          <a:p>
+            <a:fld id="{2D8B77B1-706E-6944-BD13-9A49B05C937A}" type="slidenum">
+              <a:rPr lang="ro-RO" smtClean="0"/>
+              <a:t>11</a:t>
+            </a:fld>
+            <a:endParaRPr lang="ro-RO"/>
+          </a:p>
+        </p:txBody>
+      </p:sp>
+    </p:spTree>
+    <p:extLst>
+      <p:ext uri="{BB962C8B-B14F-4D97-AF65-F5344CB8AC3E}">
+        <p14:creationId xmlns:p14="http://schemas.microsoft.com/office/powerpoint/2010/main" val="4054283190"/>
+      </p:ext>
+    </p:extLst>
+  </p:cSld>
+  <p:clrMapOvr>
+    <a:masterClrMapping/>
+  </p:clrMapOvr>
+</p:notes>
+</file>
+
+<file path=ppt/notesSlides/notesSlide7.xml><?xml version="1.0" encoding="utf-8"?>
+<p:notes xmlns:a="http://schemas.openxmlformats.org/drawingml/2006/main" xmlns:r="http://schemas.openxmlformats.org/officeDocument/2006/relationships" xmlns:p="http://schemas.openxmlformats.org/presentationml/2006/main">
+  <p:cSld>
+    <p:spTree>
+      <p:nvGrpSpPr>
+        <p:cNvPr id="1" name=""/>
+        <p:cNvGrpSpPr/>
+        <p:nvPr/>
+      </p:nvGrpSpPr>
+      <p:grpSpPr>
+        <a:xfrm>
+          <a:off x="0" y="0"/>
+          <a:ext cx="0" cy="0"/>
+          <a:chOff x="0" y="0"/>
+          <a:chExt cx="0" cy="0"/>
+        </a:xfrm>
+      </p:grpSpPr>
+      <p:sp>
+        <p:nvSpPr>
+          <p:cNvPr id="2" name="Slide Image Placeholder 1"/>
+          <p:cNvSpPr>
+            <a:spLocks noGrp="1" noRot="1" noChangeAspect="1"/>
+          </p:cNvSpPr>
+          <p:nvPr>
+            <p:ph type="sldImg"/>
+          </p:nvPr>
+        </p:nvSpPr>
+        <p:spPr/>
+      </p:sp>
+      <p:sp>
+        <p:nvSpPr>
+          <p:cNvPr id="3" name="Notes Placeholder 2"/>
+          <p:cNvSpPr>
+            <a:spLocks noGrp="1"/>
+          </p:cNvSpPr>
+          <p:nvPr>
+            <p:ph type="body" idx="1"/>
+          </p:nvPr>
+        </p:nvSpPr>
+        <p:spPr/>
+        <p:txBody>
+          <a:bodyPr/>
+          <a:lstStyle/>
+          <a:p>
+            <a:r>
+              <a:rPr lang="en-US" dirty="0" err="1"/>
+              <a:t>Poze</a:t>
+            </a:r>
+            <a:r>
+              <a:rPr lang="en-US" dirty="0"/>
+              <a:t> din </a:t>
+            </a:r>
+            <a:r>
+              <a:rPr lang="en-US" dirty="0" err="1"/>
+              <a:t>aplicatie</a:t>
+            </a:r>
+            <a:r>
+              <a:rPr lang="en-US" dirty="0"/>
+              <a:t>.</a:t>
+            </a:r>
+            <a:endParaRPr lang="ro-RO" dirty="0"/>
+          </a:p>
+        </p:txBody>
+      </p:sp>
+      <p:sp>
+        <p:nvSpPr>
+          <p:cNvPr id="4" name="Slide Number Placeholder 3"/>
+          <p:cNvSpPr>
+            <a:spLocks noGrp="1"/>
+          </p:cNvSpPr>
+          <p:nvPr>
+            <p:ph type="sldNum" sz="quarter" idx="5"/>
+          </p:nvPr>
+        </p:nvSpPr>
+        <p:spPr/>
+        <p:txBody>
+          <a:bodyPr/>
+          <a:lstStyle/>
+          <a:p>
+            <a:fld id="{2D8B77B1-706E-6944-BD13-9A49B05C937A}" type="slidenum">
+              <a:rPr lang="ro-RO" smtClean="0"/>
+              <a:t>13</a:t>
+            </a:fld>
+            <a:endParaRPr lang="ro-RO"/>
+          </a:p>
+        </p:txBody>
+      </p:sp>
+    </p:spTree>
+    <p:extLst>
+      <p:ext uri="{BB962C8B-B14F-4D97-AF65-F5344CB8AC3E}">
+        <p14:creationId xmlns:p14="http://schemas.microsoft.com/office/powerpoint/2010/main" val="3074273330"/>
+      </p:ext>
+    </p:extLst>
+  </p:cSld>
+  <p:clrMapOvr>
+    <a:masterClrMapping/>
+  </p:clrMapOvr>
+</p:notes>
+</file>
+
+<file path=ppt/notesSlides/notesSlide8.xml><?xml version="1.0" encoding="utf-8"?>
+<p:notes xmlns:a="http://schemas.openxmlformats.org/drawingml/2006/main" xmlns:r="http://schemas.openxmlformats.org/officeDocument/2006/relationships" xmlns:p="http://schemas.openxmlformats.org/presentationml/2006/main">
+  <p:cSld>
+    <p:spTree>
+      <p:nvGrpSpPr>
+        <p:cNvPr id="1" name=""/>
+        <p:cNvGrpSpPr/>
+        <p:nvPr/>
+      </p:nvGrpSpPr>
+      <p:grpSpPr>
+        <a:xfrm>
+          <a:off x="0" y="0"/>
+          <a:ext cx="0" cy="0"/>
+          <a:chOff x="0" y="0"/>
+          <a:chExt cx="0" cy="0"/>
+        </a:xfrm>
+      </p:grpSpPr>
+      <p:sp>
+        <p:nvSpPr>
+          <p:cNvPr id="2" name="Slide Image Placeholder 1"/>
+          <p:cNvSpPr>
+            <a:spLocks noGrp="1" noRot="1" noChangeAspect="1"/>
+          </p:cNvSpPr>
+          <p:nvPr>
+            <p:ph type="sldImg"/>
+          </p:nvPr>
+        </p:nvSpPr>
+        <p:spPr/>
+      </p:sp>
+      <p:sp>
+        <p:nvSpPr>
+          <p:cNvPr id="3" name="Notes Placeholder 2"/>
+          <p:cNvSpPr>
+            <a:spLocks noGrp="1"/>
+          </p:cNvSpPr>
+          <p:nvPr>
+            <p:ph type="body" idx="1"/>
+          </p:nvPr>
+        </p:nvSpPr>
+        <p:spPr/>
+        <p:txBody>
+          <a:bodyPr/>
+          <a:lstStyle/>
+          <a:p>
             <a:endParaRPr lang="ro-RO" dirty="0"/>
           </a:p>
         </p:txBody>
@@ -897,6 +1783,94 @@
     <p:extLst>
       <p:ext uri="{BB962C8B-B14F-4D97-AF65-F5344CB8AC3E}">
         <p14:creationId xmlns:p14="http://schemas.microsoft.com/office/powerpoint/2010/main" val="99292145"/>
+      </p:ext>
+    </p:extLst>
+  </p:cSld>
+  <p:clrMapOvr>
+    <a:masterClrMapping/>
+  </p:clrMapOvr>
+</p:notes>
+</file>
+
+<file path=ppt/notesSlides/notesSlide9.xml><?xml version="1.0" encoding="utf-8"?>
+<p:notes xmlns:a="http://schemas.openxmlformats.org/drawingml/2006/main" xmlns:r="http://schemas.openxmlformats.org/officeDocument/2006/relationships" xmlns:p="http://schemas.openxmlformats.org/presentationml/2006/main">
+  <p:cSld>
+    <p:spTree>
+      <p:nvGrpSpPr>
+        <p:cNvPr id="1" name=""/>
+        <p:cNvGrpSpPr/>
+        <p:nvPr/>
+      </p:nvGrpSpPr>
+      <p:grpSpPr>
+        <a:xfrm>
+          <a:off x="0" y="0"/>
+          <a:ext cx="0" cy="0"/>
+          <a:chOff x="0" y="0"/>
+          <a:chExt cx="0" cy="0"/>
+        </a:xfrm>
+      </p:grpSpPr>
+      <p:sp>
+        <p:nvSpPr>
+          <p:cNvPr id="2" name="Slide Image Placeholder 1"/>
+          <p:cNvSpPr>
+            <a:spLocks noGrp="1" noRot="1" noChangeAspect="1"/>
+          </p:cNvSpPr>
+          <p:nvPr>
+            <p:ph type="sldImg"/>
+          </p:nvPr>
+        </p:nvSpPr>
+        <p:spPr/>
+      </p:sp>
+      <p:sp>
+        <p:nvSpPr>
+          <p:cNvPr id="3" name="Notes Placeholder 2"/>
+          <p:cNvSpPr>
+            <a:spLocks noGrp="1"/>
+          </p:cNvSpPr>
+          <p:nvPr>
+            <p:ph type="body" idx="1"/>
+          </p:nvPr>
+        </p:nvSpPr>
+        <p:spPr/>
+        <p:txBody>
+          <a:bodyPr/>
+          <a:lstStyle/>
+          <a:p>
+            <a:r>
+              <a:rPr lang="en-US" dirty="0"/>
+              <a:t>CUM FUNCTIONEAZA APLICATIA, CU POZA, SERVER, ID, ETC</a:t>
+            </a:r>
+            <a:endParaRPr lang="ro-RO" dirty="0"/>
+          </a:p>
+        </p:txBody>
+      </p:sp>
+      <p:sp>
+        <p:nvSpPr>
+          <p:cNvPr id="4" name="Slide Number Placeholder 3"/>
+          <p:cNvSpPr>
+            <a:spLocks noGrp="1"/>
+          </p:cNvSpPr>
+          <p:nvPr>
+            <p:ph type="sldNum" sz="quarter" idx="5"/>
+          </p:nvPr>
+        </p:nvSpPr>
+        <p:spPr/>
+        <p:txBody>
+          <a:bodyPr/>
+          <a:lstStyle/>
+          <a:p>
+            <a:fld id="{2D8B77B1-706E-6944-BD13-9A49B05C937A}" type="slidenum">
+              <a:rPr lang="ro-RO" smtClean="0"/>
+              <a:t>19</a:t>
+            </a:fld>
+            <a:endParaRPr lang="ro-RO"/>
+          </a:p>
+        </p:txBody>
+      </p:sp>
+    </p:spTree>
+    <p:extLst>
+      <p:ext uri="{BB962C8B-B14F-4D97-AF65-F5344CB8AC3E}">
+        <p14:creationId xmlns:p14="http://schemas.microsoft.com/office/powerpoint/2010/main" val="825450492"/>
       </p:ext>
     </p:extLst>
   </p:cSld>
@@ -8325,7 +9299,7 @@
         </p:nvSpPr>
         <p:spPr>
           <a:xfrm>
-            <a:off x="677863" y="2160588"/>
+            <a:off x="850583" y="2045162"/>
             <a:ext cx="8596312" cy="3881437"/>
           </a:xfrm>
           <a:prstGeom prst="rect">
@@ -8772,6 +9746,7 @@
               <a:rPr lang="ro-RO" dirty="0"/>
               <a:t>Soluția propusă</a:t>
             </a:r>
+            <a:endParaRPr lang="en-US" dirty="0"/>
           </a:p>
           <a:p>
             <a:pPr>
@@ -8781,15 +9756,15 @@
             </a:pPr>
             <a:r>
               <a:rPr lang="ro-RO" dirty="0"/>
-              <a:t>Extragere</a:t>
+              <a:t>Arhitectura</a:t>
             </a:r>
             <a:r>
               <a:rPr lang="en-US" dirty="0"/>
-              <a:t>a</a:t>
+              <a:t> </a:t>
             </a:r>
             <a:r>
               <a:rPr lang="ro-RO" dirty="0"/>
-              <a:t> datelor</a:t>
+              <a:t>proiectului</a:t>
             </a:r>
           </a:p>
           <a:p>
@@ -8800,7 +9775,15 @@
             </a:pPr>
             <a:r>
               <a:rPr lang="ro-RO" dirty="0"/>
-              <a:t>Managementul plăților</a:t>
+              <a:t>Extragere</a:t>
+            </a:r>
+            <a:r>
+              <a:rPr lang="en-US" dirty="0"/>
+              <a:t>a</a:t>
+            </a:r>
+            <a:r>
+              <a:rPr lang="ro-RO" dirty="0"/>
+              <a:t> datelor</a:t>
             </a:r>
           </a:p>
           <a:p>
@@ -8811,9 +9794,8 @@
             </a:pPr>
             <a:r>
               <a:rPr lang="ro-RO" dirty="0"/>
-              <a:t>Realizarea plăților</a:t>
-            </a:r>
-            <a:endParaRPr lang="en-US" dirty="0"/>
+              <a:t>Managementul plăților</a:t>
+            </a:r>
           </a:p>
           <a:p>
             <a:pPr>
@@ -8823,16 +9805,9 @@
             </a:pPr>
             <a:r>
               <a:rPr lang="ro-RO" dirty="0"/>
-              <a:t>Arhitectura</a:t>
-            </a:r>
-            <a:r>
-              <a:rPr lang="en-US" dirty="0"/>
-              <a:t> </a:t>
-            </a:r>
-            <a:r>
-              <a:rPr lang="ro-RO" dirty="0"/>
-              <a:t>proiectului</a:t>
-            </a:r>
+              <a:t>Realizarea plăților</a:t>
+            </a:r>
+            <a:endParaRPr lang="en-US" dirty="0"/>
           </a:p>
           <a:p>
             <a:pPr>
@@ -8967,7 +9942,7 @@
           </p:nvPr>
         </p:nvPicPr>
         <p:blipFill>
-          <a:blip r:embed="rId2"/>
+          <a:blip r:embed="rId3"/>
           <a:stretch>
             <a:fillRect/>
           </a:stretch>
@@ -9280,6 +10255,127 @@
           <p:cNvPr id="2" name="Title 1">
             <a:extLst>
               <a:ext uri="{FF2B5EF4-FFF2-40B4-BE49-F238E27FC236}">
+                <a16:creationId xmlns:a16="http://schemas.microsoft.com/office/drawing/2014/main" id="{71DFC330-E049-4123-8D18-9D7B88EF6106}"/>
+              </a:ext>
+            </a:extLst>
+          </p:cNvPr>
+          <p:cNvSpPr>
+            <a:spLocks noGrp="1"/>
+          </p:cNvSpPr>
+          <p:nvPr>
+            <p:ph type="title"/>
+          </p:nvPr>
+        </p:nvSpPr>
+        <p:spPr/>
+        <p:txBody>
+          <a:bodyPr/>
+          <a:lstStyle/>
+          <a:p>
+            <a:r>
+              <a:rPr lang="en-US" dirty="0"/>
+              <a:t>Future</a:t>
+            </a:r>
+            <a:endParaRPr lang="ro-RO" dirty="0"/>
+          </a:p>
+        </p:txBody>
+      </p:sp>
+      <p:sp>
+        <p:nvSpPr>
+          <p:cNvPr id="3" name="Content Placeholder 2">
+            <a:extLst>
+              <a:ext uri="{FF2B5EF4-FFF2-40B4-BE49-F238E27FC236}">
+                <a16:creationId xmlns:a16="http://schemas.microsoft.com/office/drawing/2014/main" id="{B694E6D5-D143-42CD-94E3-B95EB2AA5783}"/>
+              </a:ext>
+            </a:extLst>
+          </p:cNvPr>
+          <p:cNvSpPr>
+            <a:spLocks noGrp="1"/>
+          </p:cNvSpPr>
+          <p:nvPr>
+            <p:ph idx="1"/>
+          </p:nvPr>
+        </p:nvSpPr>
+        <p:spPr/>
+        <p:txBody>
+          <a:bodyPr/>
+          <a:lstStyle/>
+          <a:p>
+            <a:r>
+              <a:rPr lang="en-US" dirty="0" err="1"/>
+              <a:t>qr</a:t>
+            </a:r>
+            <a:r>
+              <a:rPr lang="en-US" dirty="0"/>
+              <a:t>-code</a:t>
+            </a:r>
+            <a:endParaRPr lang="ro-RO" dirty="0"/>
+          </a:p>
+        </p:txBody>
+      </p:sp>
+      <p:sp>
+        <p:nvSpPr>
+          <p:cNvPr id="4" name="Slide Number Placeholder 3">
+            <a:extLst>
+              <a:ext uri="{FF2B5EF4-FFF2-40B4-BE49-F238E27FC236}">
+                <a16:creationId xmlns:a16="http://schemas.microsoft.com/office/drawing/2014/main" id="{D913F57C-9846-4473-9318-8D5E1ACAF7C9}"/>
+              </a:ext>
+            </a:extLst>
+          </p:cNvPr>
+          <p:cNvSpPr>
+            <a:spLocks noGrp="1"/>
+          </p:cNvSpPr>
+          <p:nvPr>
+            <p:ph type="sldNum" sz="quarter" idx="12"/>
+          </p:nvPr>
+        </p:nvSpPr>
+        <p:spPr/>
+        <p:txBody>
+          <a:bodyPr/>
+          <a:lstStyle/>
+          <a:p>
+            <a:fld id="{BABCF458-AFE6-754E-9B16-FD8D831A10CC}" type="slidenum">
+              <a:rPr lang="en-US" smtClean="0"/>
+              <a:t>22</a:t>
+            </a:fld>
+            <a:endParaRPr lang="en-US"/>
+          </a:p>
+        </p:txBody>
+      </p:sp>
+    </p:spTree>
+    <p:extLst>
+      <p:ext uri="{BB962C8B-B14F-4D97-AF65-F5344CB8AC3E}">
+        <p14:creationId xmlns:p14="http://schemas.microsoft.com/office/powerpoint/2010/main" val="1090302623"/>
+      </p:ext>
+    </p:extLst>
+  </p:cSld>
+  <p:clrMapOvr>
+    <a:masterClrMapping/>
+  </p:clrMapOvr>
+</p:sld>
+</file>
+
+<file path=ppt/slides/slide23.xml><?xml version="1.0" encoding="utf-8"?>
+<p:sld xmlns:a="http://schemas.openxmlformats.org/drawingml/2006/main" xmlns:r="http://schemas.openxmlformats.org/officeDocument/2006/relationships" xmlns:p="http://schemas.openxmlformats.org/presentationml/2006/main">
+  <p:cSld>
+    <p:spTree>
+      <p:nvGrpSpPr>
+        <p:cNvPr id="1" name=""/>
+        <p:cNvGrpSpPr/>
+        <p:nvPr/>
+      </p:nvGrpSpPr>
+      <p:grpSpPr>
+        <a:xfrm>
+          <a:off x="0" y="0"/>
+          <a:ext cx="0" cy="0"/>
+          <a:chOff x="0" y="0"/>
+          <a:chExt cx="0" cy="0"/>
+        </a:xfrm>
+      </p:grpSpPr>
+      <p:sp>
+        <p:nvSpPr>
+          <p:cNvPr id="2" name="Title 1">
+            <a:extLst>
+              <a:ext uri="{FF2B5EF4-FFF2-40B4-BE49-F238E27FC236}">
                 <a16:creationId xmlns:a16="http://schemas.microsoft.com/office/drawing/2014/main" id="{BA148093-6499-9F47-954E-82FCD41AA259}"/>
               </a:ext>
             </a:extLst>
@@ -9399,7 +10495,7 @@
           <a:p>
             <a:fld id="{BABCF458-AFE6-754E-9B16-FD8D831A10CC}" type="slidenum">
               <a:rPr lang="en-US" smtClean="0"/>
-              <a:t>22</a:t>
+              <a:t>23</a:t>
             </a:fld>
             <a:endParaRPr lang="en-US"/>
           </a:p>

</xml_diff>